<commit_message>
First review of API guides.
</commit_message>
<xml_diff>
--- a/api/overview/img/concepts.pptx
+++ b/api/overview/img/concepts.pptx
@@ -3133,7 +3133,7 @@
             <a:avLst/>
           </a:prstGeom>
           <a:solidFill>
-            <a:srgbClr val="00A0DE"/>
+            <a:srgbClr val="FFFFFF"/>
           </a:solidFill>
           <a:ln>
             <a:solidFill>
@@ -3282,8 +3282,8 @@
         </p:nvSpPr>
         <p:spPr>
           <a:xfrm>
-            <a:off x="7581135" y="6264657"/>
-            <a:ext cx="543739" cy="307777"/>
+            <a:off x="7504191" y="6264657"/>
+            <a:ext cx="697627" cy="400110"/>
           </a:xfrm>
           <a:prstGeom prst="rect">
             <a:avLst/>
@@ -3298,14 +3298,14 @@
           <a:p>
             <a:pPr algn="ctr"/>
             <a:r>
-              <a:rPr kumimoji="1" lang="zh-CN" altLang="en-US" sz="1400" dirty="0" smtClean="0">
+              <a:rPr kumimoji="1" lang="zh-CN" altLang="en-US" sz="2000" dirty="0" smtClean="0">
                 <a:latin typeface="Hei"/>
                 <a:ea typeface="Hei"/>
                 <a:cs typeface="Hei"/>
               </a:rPr>
               <a:t>用户</a:t>
             </a:r>
-            <a:endParaRPr kumimoji="1" lang="zh-CN" altLang="en-US" sz="1400" dirty="0">
+            <a:endParaRPr kumimoji="1" lang="zh-CN" altLang="en-US" sz="2000" dirty="0">
               <a:latin typeface="Hei"/>
               <a:ea typeface="Hei"/>
               <a:cs typeface="Hei"/>
@@ -3487,7 +3487,9 @@
           <a:prstGeom prst="rect">
             <a:avLst/>
           </a:prstGeom>
-          <a:noFill/>
+          <a:solidFill>
+            <a:srgbClr val="FFFFFF"/>
+          </a:solidFill>
         </p:spPr>
         <p:txBody>
           <a:bodyPr wrap="none" rtlCol="0">
@@ -3496,7 +3498,7 @@
           <a:lstStyle/>
           <a:p>
             <a:r>
-              <a:rPr kumimoji="1" lang="zh-CN" altLang="en-US" sz="1400">
+              <a:rPr kumimoji="1" lang="zh-CN" altLang="en-US" sz="1400" dirty="0">
                 <a:latin typeface="Hei"/>
                 <a:ea typeface="Hei"/>
                 <a:cs typeface="Hei"/>
@@ -3504,20 +3506,12 @@
               <a:t>开发</a:t>
             </a:r>
             <a:r>
-              <a:rPr kumimoji="1" lang="zh-CN" altLang="en-US" sz="1400" smtClean="0">
-                <a:latin typeface="Hei"/>
-                <a:ea typeface="Hei"/>
-                <a:cs typeface="Hei"/>
-              </a:rPr>
-              <a:t>基于云存储服务的应</a:t>
-            </a:r>
-            <a:r>
               <a:rPr kumimoji="1" lang="zh-CN" altLang="en-US" sz="1400" dirty="0" smtClean="0">
                 <a:latin typeface="Hei"/>
                 <a:ea typeface="Hei"/>
                 <a:cs typeface="Hei"/>
               </a:rPr>
-              <a:t>用</a:t>
+              <a:t>基于云存储服务的应用</a:t>
             </a:r>
             <a:endParaRPr kumimoji="1" lang="zh-CN" altLang="en-US" sz="1400" dirty="0">
               <a:latin typeface="Hei"/>
@@ -3573,8 +3567,8 @@
         </p:nvSpPr>
         <p:spPr>
           <a:xfrm>
-            <a:off x="879674" y="6235017"/>
-            <a:ext cx="723275" cy="307777"/>
+            <a:off x="764258" y="6235017"/>
+            <a:ext cx="954107" cy="400110"/>
           </a:xfrm>
           <a:prstGeom prst="rect">
             <a:avLst/>
@@ -3589,14 +3583,14 @@
           <a:p>
             <a:pPr algn="ctr"/>
             <a:r>
-              <a:rPr kumimoji="1" lang="zh-CN" altLang="en-US" sz="1400" dirty="0" smtClean="0">
+              <a:rPr kumimoji="1" lang="zh-CN" altLang="en-US" sz="2000" dirty="0" smtClean="0">
                 <a:latin typeface="Hei"/>
                 <a:ea typeface="Hei"/>
                 <a:cs typeface="Hei"/>
               </a:rPr>
               <a:t>开发者</a:t>
             </a:r>
-            <a:endParaRPr kumimoji="1" lang="zh-CN" altLang="en-US" sz="1400" dirty="0">
+            <a:endParaRPr kumimoji="1" lang="zh-CN" altLang="en-US" sz="2000" dirty="0">
               <a:latin typeface="Hei"/>
               <a:ea typeface="Hei"/>
               <a:cs typeface="Hei"/>

</xml_diff>